<commit_message>
Final Version Project 4
</commit_message>
<xml_diff>
--- a/Project 4/Soyinka_Sowoolu_3_Slidedeck.pptx
+++ b/Project 4/Soyinka_Sowoolu_3_Slidedeck.pptx
@@ -147,7 +147,7 @@
   <pc:docChgLst>
     <pc:chgData name="Diekrons MCL" userId="b6f93fc8970d2d55" providerId="LiveId" clId="{F2B63147-DBAB-4CEF-B6B2-2B2F1CEBD6C6}"/>
     <pc:docChg chg="undo redo custSel addSld delSld modSld sldOrd modMainMaster">
-      <pc:chgData name="Diekrons MCL" userId="b6f93fc8970d2d55" providerId="LiveId" clId="{F2B63147-DBAB-4CEF-B6B2-2B2F1CEBD6C6}" dt="2023-01-09T00:24:57.049" v="3311" actId="20577"/>
+      <pc:chgData name="Diekrons MCL" userId="b6f93fc8970d2d55" providerId="LiveId" clId="{F2B63147-DBAB-4CEF-B6B2-2B2F1CEBD6C6}" dt="2023-01-17T16:21:04.924" v="3395" actId="2711"/>
       <pc:docMkLst>
         <pc:docMk/>
       </pc:docMkLst>
@@ -913,7 +913,7 @@
         </pc:picChg>
       </pc:sldChg>
       <pc:sldChg chg="addSp delSp modSp add mod setBg">
-        <pc:chgData name="Diekrons MCL" userId="b6f93fc8970d2d55" providerId="LiveId" clId="{F2B63147-DBAB-4CEF-B6B2-2B2F1CEBD6C6}" dt="2023-01-09T00:03:50.412" v="2626" actId="20577"/>
+        <pc:chgData name="Diekrons MCL" userId="b6f93fc8970d2d55" providerId="LiveId" clId="{F2B63147-DBAB-4CEF-B6B2-2B2F1CEBD6C6}" dt="2023-01-17T16:21:04.924" v="3395" actId="2711"/>
         <pc:sldMkLst>
           <pc:docMk/>
           <pc:sldMk cId="1998562957" sldId="365"/>
@@ -983,6 +983,14 @@
           </ac:spMkLst>
         </pc:spChg>
         <pc:spChg chg="mod">
+          <ac:chgData name="Diekrons MCL" userId="b6f93fc8970d2d55" providerId="LiveId" clId="{F2B63147-DBAB-4CEF-B6B2-2B2F1CEBD6C6}" dt="2023-01-17T16:21:04.924" v="3395" actId="2711"/>
+          <ac:spMkLst>
+            <pc:docMk/>
+            <pc:sldMk cId="1998562957" sldId="365"/>
+            <ac:spMk id="84" creationId="{00000000-0000-0000-0000-000000000000}"/>
+          </ac:spMkLst>
+        </pc:spChg>
+        <pc:spChg chg="mod">
           <ac:chgData name="Diekrons MCL" userId="b6f93fc8970d2d55" providerId="LiveId" clId="{F2B63147-DBAB-4CEF-B6B2-2B2F1CEBD6C6}" dt="2023-01-08T23:58:52.173" v="2465" actId="20577"/>
           <ac:spMkLst>
             <pc:docMk/>
@@ -999,7 +1007,7 @@
           </ac:spMkLst>
         </pc:spChg>
         <pc:spChg chg="mod">
-          <ac:chgData name="Diekrons MCL" userId="b6f93fc8970d2d55" providerId="LiveId" clId="{F2B63147-DBAB-4CEF-B6B2-2B2F1CEBD6C6}" dt="2023-01-09T00:03:25.720" v="2591" actId="20577"/>
+          <ac:chgData name="Diekrons MCL" userId="b6f93fc8970d2d55" providerId="LiveId" clId="{F2B63147-DBAB-4CEF-B6B2-2B2F1CEBD6C6}" dt="2023-01-17T16:19:27.619" v="3376" actId="313"/>
           <ac:spMkLst>
             <pc:docMk/>
             <pc:sldMk cId="1998562957" sldId="365"/>
@@ -3040,13 +3048,13 @@
         </pc:picChg>
       </pc:sldChg>
       <pc:sldChg chg="addSp delSp modSp add mod">
-        <pc:chgData name="Diekrons MCL" userId="b6f93fc8970d2d55" providerId="LiveId" clId="{F2B63147-DBAB-4CEF-B6B2-2B2F1CEBD6C6}" dt="2023-01-09T00:21:48.790" v="3294" actId="1076"/>
+        <pc:chgData name="Diekrons MCL" userId="b6f93fc8970d2d55" providerId="LiveId" clId="{F2B63147-DBAB-4CEF-B6B2-2B2F1CEBD6C6}" dt="2023-01-16T13:58:20.182" v="3375" actId="20577"/>
         <pc:sldMkLst>
           <pc:docMk/>
           <pc:sldMk cId="279302283" sldId="409"/>
         </pc:sldMkLst>
         <pc:spChg chg="mod">
-          <ac:chgData name="Diekrons MCL" userId="b6f93fc8970d2d55" providerId="LiveId" clId="{F2B63147-DBAB-4CEF-B6B2-2B2F1CEBD6C6}" dt="2023-01-09T00:16:46.050" v="3120" actId="12"/>
+          <ac:chgData name="Diekrons MCL" userId="b6f93fc8970d2d55" providerId="LiveId" clId="{F2B63147-DBAB-4CEF-B6B2-2B2F1CEBD6C6}" dt="2023-01-16T13:58:20.182" v="3375" actId="20577"/>
           <ac:spMkLst>
             <pc:docMk/>
             <pc:sldMk cId="279302283" sldId="409"/>
@@ -3371,7 +3379,7 @@
           <a:p>
             <a:fld id="{370FBB19-0126-4A26-B232-303B9D304E27}" type="datetimeFigureOut">
               <a:rPr lang="en-US" smtClean="0"/>
-              <a:t>1/8/2023</a:t>
+              <a:t>1/16/2023</a:t>
             </a:fld>
             <a:endParaRPr lang="en-US"/>
           </a:p>
@@ -3944,7 +3952,7 @@
           <a:p>
             <a:fld id="{66C19A3A-8540-45AB-80CF-3967564A1FBC}" type="datetimeFigureOut">
               <a:rPr lang="en-US" smtClean="0"/>
-              <a:t>1/8/2023</a:t>
+              <a:t>1/16/2023</a:t>
             </a:fld>
             <a:endParaRPr lang="en-US"/>
           </a:p>
@@ -4112,7 +4120,7 @@
           <a:p>
             <a:fld id="{66C19A3A-8540-45AB-80CF-3967564A1FBC}" type="datetimeFigureOut">
               <a:rPr lang="en-US" smtClean="0"/>
-              <a:t>1/8/2023</a:t>
+              <a:t>1/16/2023</a:t>
             </a:fld>
             <a:endParaRPr lang="en-US"/>
           </a:p>
@@ -4290,7 +4298,7 @@
           <a:p>
             <a:fld id="{66C19A3A-8540-45AB-80CF-3967564A1FBC}" type="datetimeFigureOut">
               <a:rPr lang="en-US" smtClean="0"/>
-              <a:t>1/8/2023</a:t>
+              <a:t>1/16/2023</a:t>
             </a:fld>
             <a:endParaRPr lang="en-US"/>
           </a:p>
@@ -4458,7 +4466,7 @@
           <a:p>
             <a:fld id="{66C19A3A-8540-45AB-80CF-3967564A1FBC}" type="datetimeFigureOut">
               <a:rPr lang="en-US" smtClean="0"/>
-              <a:t>1/8/2023</a:t>
+              <a:t>1/16/2023</a:t>
             </a:fld>
             <a:endParaRPr lang="en-US"/>
           </a:p>
@@ -4703,7 +4711,7 @@
           <a:p>
             <a:fld id="{66C19A3A-8540-45AB-80CF-3967564A1FBC}" type="datetimeFigureOut">
               <a:rPr lang="en-US" smtClean="0"/>
-              <a:t>1/8/2023</a:t>
+              <a:t>1/16/2023</a:t>
             </a:fld>
             <a:endParaRPr lang="en-US"/>
           </a:p>
@@ -4932,7 +4940,7 @@
           <a:p>
             <a:fld id="{66C19A3A-8540-45AB-80CF-3967564A1FBC}" type="datetimeFigureOut">
               <a:rPr lang="en-US" smtClean="0"/>
-              <a:t>1/8/2023</a:t>
+              <a:t>1/16/2023</a:t>
             </a:fld>
             <a:endParaRPr lang="en-US"/>
           </a:p>
@@ -5296,7 +5304,7 @@
           <a:p>
             <a:fld id="{66C19A3A-8540-45AB-80CF-3967564A1FBC}" type="datetimeFigureOut">
               <a:rPr lang="en-US" smtClean="0"/>
-              <a:t>1/8/2023</a:t>
+              <a:t>1/16/2023</a:t>
             </a:fld>
             <a:endParaRPr lang="en-US"/>
           </a:p>
@@ -5413,7 +5421,7 @@
           <a:p>
             <a:fld id="{66C19A3A-8540-45AB-80CF-3967564A1FBC}" type="datetimeFigureOut">
               <a:rPr lang="en-US" smtClean="0"/>
-              <a:t>1/8/2023</a:t>
+              <a:t>1/16/2023</a:t>
             </a:fld>
             <a:endParaRPr lang="en-US"/>
           </a:p>
@@ -5508,7 +5516,7 @@
           <a:p>
             <a:fld id="{66C19A3A-8540-45AB-80CF-3967564A1FBC}" type="datetimeFigureOut">
               <a:rPr lang="en-US" smtClean="0"/>
-              <a:t>1/8/2023</a:t>
+              <a:t>1/16/2023</a:t>
             </a:fld>
             <a:endParaRPr lang="en-US"/>
           </a:p>
@@ -5783,7 +5791,7 @@
           <a:p>
             <a:fld id="{66C19A3A-8540-45AB-80CF-3967564A1FBC}" type="datetimeFigureOut">
               <a:rPr lang="en-US" smtClean="0"/>
-              <a:t>1/8/2023</a:t>
+              <a:t>1/16/2023</a:t>
             </a:fld>
             <a:endParaRPr lang="en-US"/>
           </a:p>
@@ -6035,7 +6043,7 @@
           <a:p>
             <a:fld id="{66C19A3A-8540-45AB-80CF-3967564A1FBC}" type="datetimeFigureOut">
               <a:rPr lang="en-US" smtClean="0"/>
-              <a:t>1/8/2023</a:t>
+              <a:t>1/16/2023</a:t>
             </a:fld>
             <a:endParaRPr lang="en-US"/>
           </a:p>
@@ -6251,7 +6259,7 @@
           <a:p>
             <a:fld id="{66C19A3A-8540-45AB-80CF-3967564A1FBC}" type="datetimeFigureOut">
               <a:rPr lang="en-US" smtClean="0"/>
-              <a:t>1/8/2023</a:t>
+              <a:t>1/16/2023</a:t>
             </a:fld>
             <a:endParaRPr lang="en-US"/>
           </a:p>
@@ -16200,33 +16208,7 @@
                   <a:latin typeface="Arial" panose="020B0604020202020204" pitchFamily="34" charset="0"/>
                   <a:cs typeface="Arial" panose="020B0604020202020204" pitchFamily="34" charset="0"/>
                 </a:rPr>
-                <a:t>Ensure </a:t>
-              </a:r>
-              <a:r>
-                <a:rPr lang="en-US" sz="1600" kern="0" dirty="0" err="1">
-                  <a:solidFill>
-                    <a:prstClr val="black">
-                      <a:lumMod val="75000"/>
-                      <a:lumOff val="25000"/>
-                    </a:prstClr>
-                  </a:solidFill>
-                  <a:latin typeface="Arial" panose="020B0604020202020204" pitchFamily="34" charset="0"/>
-                  <a:cs typeface="Arial" panose="020B0604020202020204" pitchFamily="34" charset="0"/>
-                </a:rPr>
-                <a:t>Referencial</a:t>
-              </a:r>
-              <a:r>
-                <a:rPr lang="en-US" sz="1600" kern="0" dirty="0">
-                  <a:solidFill>
-                    <a:prstClr val="black">
-                      <a:lumMod val="75000"/>
-                      <a:lumOff val="25000"/>
-                    </a:prstClr>
-                  </a:solidFill>
-                  <a:latin typeface="Arial" panose="020B0604020202020204" pitchFamily="34" charset="0"/>
-                  <a:cs typeface="Arial" panose="020B0604020202020204" pitchFamily="34" charset="0"/>
-                </a:rPr>
-                <a:t> Integrity</a:t>
+                <a:t>Ensure Referential Integrity</a:t>
               </a:r>
               <a:endParaRPr lang="en-US" sz="1600" dirty="0">
                 <a:solidFill>
@@ -16942,8 +16924,8 @@
           </p:nvSpPr>
           <p:spPr>
             <a:xfrm>
-              <a:off x="6371735" y="4502913"/>
-              <a:ext cx="1189156" cy="534158"/>
+              <a:off x="6371735" y="4642810"/>
+              <a:ext cx="1189156" cy="254361"/>
             </a:xfrm>
             <a:prstGeom prst="rect">
               <a:avLst/>
@@ -16958,33 +16940,14 @@
             <a:p>
               <a:pPr algn="ctr"/>
               <a:r>
-                <a:rPr lang="en-US" sz="1800" kern="0" dirty="0">
+                <a:rPr lang="en-US" sz="1400" dirty="0">
                   <a:solidFill>
                     <a:prstClr val="black"/>
                   </a:solidFill>
-                  <a:latin typeface="Arial" panose="020B0604020202020204" pitchFamily="34" charset="0"/>
-                  <a:cs typeface="Arial" panose="020B0604020202020204" pitchFamily="34" charset="0"/>
+                  <a:latin typeface="Nunito" pitchFamily="2" charset="0"/>
                 </a:rPr>
-                <a:t>Edit</a:t>
+                <a:t>Quality Data</a:t>
               </a:r>
-            </a:p>
-            <a:p>
-              <a:pPr algn="ctr"/>
-              <a:r>
-                <a:rPr lang="en-US" sz="1800" kern="0" dirty="0">
-                  <a:solidFill>
-                    <a:prstClr val="black"/>
-                  </a:solidFill>
-                  <a:latin typeface="Arial" panose="020B0604020202020204" pitchFamily="34" charset="0"/>
-                  <a:cs typeface="Arial" panose="020B0604020202020204" pitchFamily="34" charset="0"/>
-                </a:rPr>
-                <a:t>here</a:t>
-              </a:r>
-              <a:endParaRPr lang="en-US" sz="1800" dirty="0">
-                <a:solidFill>
-                  <a:prstClr val="black"/>
-                </a:solidFill>
-              </a:endParaRPr>
             </a:p>
           </p:txBody>
         </p:sp>
@@ -21630,7 +21593,7 @@
         </p:spPr>
         <p:txBody>
           <a:bodyPr vert="horz" lIns="91440" tIns="45720" rIns="91440" bIns="45720" rtlCol="0">
-            <a:normAutofit lnSpcReduction="10000"/>
+            <a:normAutofit fontScale="92500" lnSpcReduction="20000"/>
           </a:bodyPr>
           <a:lstStyle>
             <a:lvl1pPr marL="228600" indent="-228600" algn="l" defTabSz="914400" rtl="0" eaLnBrk="1" latinLnBrk="0" hangingPunct="1">
@@ -21806,7 +21769,7 @@
               <a:rPr lang="en-US" sz="2400" i="1" kern="0" dirty="0">
                 <a:latin typeface="Nunito" pitchFamily="2" charset="0"/>
               </a:rPr>
-              <a:t>There is no ethical issues</a:t>
+              <a:t>Privacy Policy-Are users aware of how data will be used?</a:t>
             </a:r>
           </a:p>
           <a:p>

</xml_diff>